<commit_message>
Ra-35 Bereit zum Preview
Datenmodell für DB wurde ergänzt
</commit_message>
<xml_diff>
--- a/Solution_Design/Story Board/Storys/RA-35-Schwarzes Brett/RA-35-Schwarzes Brett.pptx
+++ b/Solution_Design/Story Board/Storys/RA-35-Schwarzes Brett/RA-35-Schwarzes Brett.pptx
@@ -12,6 +12,7 @@
     <p:sldId id="260" r:id="rId6"/>
     <p:sldId id="261" r:id="rId7"/>
     <p:sldId id="262" r:id="rId8"/>
+    <p:sldId id="263" r:id="rId9"/>
   </p:sldIdLst>
   <p:sldSz cx="12192000" cy="6858000"/>
   <p:notesSz cx="6858000" cy="9144000"/>
@@ -249,7 +250,7 @@
           <a:p>
             <a:fld id="{446AC338-7880-462F-A8B6-FF73D39380B3}" type="datetimeFigureOut">
               <a:rPr lang="de-DE" smtClean="0"/>
-              <a:t>30.11.2015</a:t>
+              <a:t>01.12.2015</a:t>
             </a:fld>
             <a:endParaRPr lang="de-DE"/>
           </a:p>
@@ -419,7 +420,7 @@
           <a:p>
             <a:fld id="{446AC338-7880-462F-A8B6-FF73D39380B3}" type="datetimeFigureOut">
               <a:rPr lang="de-DE" smtClean="0"/>
-              <a:t>30.11.2015</a:t>
+              <a:t>01.12.2015</a:t>
             </a:fld>
             <a:endParaRPr lang="de-DE"/>
           </a:p>
@@ -599,7 +600,7 @@
           <a:p>
             <a:fld id="{446AC338-7880-462F-A8B6-FF73D39380B3}" type="datetimeFigureOut">
               <a:rPr lang="de-DE" smtClean="0"/>
-              <a:t>30.11.2015</a:t>
+              <a:t>01.12.2015</a:t>
             </a:fld>
             <a:endParaRPr lang="de-DE"/>
           </a:p>
@@ -769,7 +770,7 @@
           <a:p>
             <a:fld id="{446AC338-7880-462F-A8B6-FF73D39380B3}" type="datetimeFigureOut">
               <a:rPr lang="de-DE" smtClean="0"/>
-              <a:t>30.11.2015</a:t>
+              <a:t>01.12.2015</a:t>
             </a:fld>
             <a:endParaRPr lang="de-DE"/>
           </a:p>
@@ -1015,7 +1016,7 @@
           <a:p>
             <a:fld id="{446AC338-7880-462F-A8B6-FF73D39380B3}" type="datetimeFigureOut">
               <a:rPr lang="de-DE" smtClean="0"/>
-              <a:t>30.11.2015</a:t>
+              <a:t>01.12.2015</a:t>
             </a:fld>
             <a:endParaRPr lang="de-DE"/>
           </a:p>
@@ -1247,7 +1248,7 @@
           <a:p>
             <a:fld id="{446AC338-7880-462F-A8B6-FF73D39380B3}" type="datetimeFigureOut">
               <a:rPr lang="de-DE" smtClean="0"/>
-              <a:t>30.11.2015</a:t>
+              <a:t>01.12.2015</a:t>
             </a:fld>
             <a:endParaRPr lang="de-DE"/>
           </a:p>
@@ -1614,7 +1615,7 @@
           <a:p>
             <a:fld id="{446AC338-7880-462F-A8B6-FF73D39380B3}" type="datetimeFigureOut">
               <a:rPr lang="de-DE" smtClean="0"/>
-              <a:t>30.11.2015</a:t>
+              <a:t>01.12.2015</a:t>
             </a:fld>
             <a:endParaRPr lang="de-DE"/>
           </a:p>
@@ -1732,7 +1733,7 @@
           <a:p>
             <a:fld id="{446AC338-7880-462F-A8B6-FF73D39380B3}" type="datetimeFigureOut">
               <a:rPr lang="de-DE" smtClean="0"/>
-              <a:t>30.11.2015</a:t>
+              <a:t>01.12.2015</a:t>
             </a:fld>
             <a:endParaRPr lang="de-DE"/>
           </a:p>
@@ -1827,7 +1828,7 @@
           <a:p>
             <a:fld id="{446AC338-7880-462F-A8B6-FF73D39380B3}" type="datetimeFigureOut">
               <a:rPr lang="de-DE" smtClean="0"/>
-              <a:t>30.11.2015</a:t>
+              <a:t>01.12.2015</a:t>
             </a:fld>
             <a:endParaRPr lang="de-DE"/>
           </a:p>
@@ -2104,7 +2105,7 @@
           <a:p>
             <a:fld id="{446AC338-7880-462F-A8B6-FF73D39380B3}" type="datetimeFigureOut">
               <a:rPr lang="de-DE" smtClean="0"/>
-              <a:t>30.11.2015</a:t>
+              <a:t>01.12.2015</a:t>
             </a:fld>
             <a:endParaRPr lang="de-DE"/>
           </a:p>
@@ -2357,7 +2358,7 @@
           <a:p>
             <a:fld id="{446AC338-7880-462F-A8B6-FF73D39380B3}" type="datetimeFigureOut">
               <a:rPr lang="de-DE" smtClean="0"/>
-              <a:t>30.11.2015</a:t>
+              <a:t>01.12.2015</a:t>
             </a:fld>
             <a:endParaRPr lang="de-DE"/>
           </a:p>
@@ -2570,7 +2571,7 @@
           <a:p>
             <a:fld id="{446AC338-7880-462F-A8B6-FF73D39380B3}" type="datetimeFigureOut">
               <a:rPr lang="de-DE" smtClean="0"/>
-              <a:t>30.11.2015</a:t>
+              <a:t>01.12.2015</a:t>
             </a:fld>
             <a:endParaRPr lang="de-DE"/>
           </a:p>
@@ -3875,6 +3876,13 @@
   <p:clrMapOvr>
     <a:masterClrMapping/>
   </p:clrMapOvr>
+  <p:timing>
+    <p:tnLst>
+      <p:par>
+        <p:cTn id="1" dur="indefinite" restart="never" nodeType="tmRoot"/>
+      </p:par>
+    </p:tnLst>
+  </p:timing>
 </p:sld>
 </file>
 
@@ -4431,6 +4439,13 @@
   <p:clrMapOvr>
     <a:masterClrMapping/>
   </p:clrMapOvr>
+  <p:timing>
+    <p:tnLst>
+      <p:par>
+        <p:cTn id="1" dur="indefinite" restart="never" nodeType="tmRoot"/>
+      </p:par>
+    </p:tnLst>
+  </p:timing>
 </p:sld>
 </file>
 
@@ -4545,6 +4560,13 @@
   <p:clrMapOvr>
     <a:masterClrMapping/>
   </p:clrMapOvr>
+  <p:timing>
+    <p:tnLst>
+      <p:par>
+        <p:cTn id="1" dur="indefinite" restart="never" nodeType="tmRoot"/>
+      </p:par>
+    </p:tnLst>
+  </p:timing>
 </p:sld>
 </file>
 
@@ -4995,6 +5017,250 @@
   <p:clrMapOvr>
     <a:masterClrMapping/>
   </p:clrMapOvr>
+  <p:timing>
+    <p:tnLst>
+      <p:par>
+        <p:cTn id="1" dur="indefinite" restart="never" nodeType="tmRoot"/>
+      </p:par>
+    </p:tnLst>
+  </p:timing>
+</p:sld>
+</file>
+
+<file path=ppt/slides/slide8.xml><?xml version="1.0" encoding="utf-8"?>
+<p:sld xmlns:a="http://schemas.openxmlformats.org/drawingml/2006/main" xmlns:r="http://schemas.openxmlformats.org/officeDocument/2006/relationships" xmlns:p="http://schemas.openxmlformats.org/presentationml/2006/main">
+  <p:cSld>
+    <p:spTree>
+      <p:nvGrpSpPr>
+        <p:cNvPr id="1" name=""/>
+        <p:cNvGrpSpPr/>
+        <p:nvPr/>
+      </p:nvGrpSpPr>
+      <p:grpSpPr>
+        <a:xfrm>
+          <a:off x="0" y="0"/>
+          <a:ext cx="0" cy="0"/>
+          <a:chOff x="0" y="0"/>
+          <a:chExt cx="0" cy="0"/>
+        </a:xfrm>
+      </p:grpSpPr>
+      <p:sp>
+        <p:nvSpPr>
+          <p:cNvPr id="2" name="Titel 1"/>
+          <p:cNvSpPr>
+            <a:spLocks noGrp="1"/>
+          </p:cNvSpPr>
+          <p:nvPr>
+            <p:ph type="title"/>
+          </p:nvPr>
+        </p:nvSpPr>
+        <p:spPr/>
+        <p:txBody>
+          <a:bodyPr/>
+          <a:lstStyle/>
+          <a:p>
+            <a:r>
+              <a:rPr lang="de-DE" dirty="0" smtClean="0"/>
+              <a:t>Schwarzes Brett</a:t>
+            </a:r>
+            <a:endParaRPr lang="de-DE" dirty="0"/>
+          </a:p>
+        </p:txBody>
+      </p:sp>
+      <p:sp>
+        <p:nvSpPr>
+          <p:cNvPr id="3" name="Inhaltsplatzhalter 2"/>
+          <p:cNvSpPr>
+            <a:spLocks noGrp="1"/>
+          </p:cNvSpPr>
+          <p:nvPr>
+            <p:ph idx="1"/>
+          </p:nvPr>
+        </p:nvSpPr>
+        <p:spPr/>
+        <p:txBody>
+          <a:bodyPr/>
+          <a:lstStyle/>
+          <a:p>
+            <a:pPr marL="0" indent="0">
+              <a:buNone/>
+            </a:pPr>
+            <a:endParaRPr lang="de-DE" dirty="0"/>
+          </a:p>
+        </p:txBody>
+      </p:sp>
+      <p:pic>
+        <p:nvPicPr>
+          <p:cNvPr id="4" name="Grafik 3"/>
+          <p:cNvPicPr>
+            <a:picLocks noChangeAspect="1"/>
+          </p:cNvPicPr>
+          <p:nvPr/>
+        </p:nvPicPr>
+        <p:blipFill rotWithShape="1">
+          <a:blip r:embed="rId2"/>
+          <a:srcRect l="-21038" t="9181" r="50215" b="18768"/>
+          <a:stretch/>
+        </p:blipFill>
+        <p:spPr>
+          <a:xfrm>
+            <a:off x="-4541135" y="0"/>
+            <a:ext cx="15308722" cy="6157732"/>
+          </a:xfrm>
+          <a:prstGeom prst="rect">
+            <a:avLst/>
+          </a:prstGeom>
+        </p:spPr>
+      </p:pic>
+      <p:sp>
+        <p:nvSpPr>
+          <p:cNvPr id="5" name="Rechteck 4"/>
+          <p:cNvSpPr/>
+          <p:nvPr/>
+        </p:nvSpPr>
+        <p:spPr>
+          <a:xfrm>
+            <a:off x="578734" y="2604303"/>
+            <a:ext cx="3264061" cy="324091"/>
+          </a:xfrm>
+          <a:prstGeom prst="rect">
+            <a:avLst/>
+          </a:prstGeom>
+        </p:spPr>
+        <p:style>
+          <a:lnRef idx="2">
+            <a:schemeClr val="accent1">
+              <a:shade val="50000"/>
+            </a:schemeClr>
+          </a:lnRef>
+          <a:fillRef idx="1">
+            <a:schemeClr val="accent1"/>
+          </a:fillRef>
+          <a:effectRef idx="0">
+            <a:schemeClr val="accent1"/>
+          </a:effectRef>
+          <a:fontRef idx="minor">
+            <a:schemeClr val="lt1"/>
+          </a:fontRef>
+        </p:style>
+        <p:txBody>
+          <a:bodyPr rtlCol="0" anchor="ctr"/>
+          <a:lstStyle/>
+          <a:p>
+            <a:pPr algn="ctr"/>
+            <a:r>
+              <a:rPr lang="de-DE" dirty="0" smtClean="0"/>
+              <a:t>Titel 1</a:t>
+            </a:r>
+            <a:endParaRPr lang="de-DE" dirty="0"/>
+          </a:p>
+        </p:txBody>
+      </p:sp>
+      <p:sp>
+        <p:nvSpPr>
+          <p:cNvPr id="6" name="Rechteck 5"/>
+          <p:cNvSpPr/>
+          <p:nvPr/>
+        </p:nvSpPr>
+        <p:spPr>
+          <a:xfrm>
+            <a:off x="578734" y="2928394"/>
+            <a:ext cx="7986532" cy="682907"/>
+          </a:xfrm>
+          <a:prstGeom prst="rect">
+            <a:avLst/>
+          </a:prstGeom>
+        </p:spPr>
+        <p:style>
+          <a:lnRef idx="2">
+            <a:schemeClr val="accent1">
+              <a:shade val="50000"/>
+            </a:schemeClr>
+          </a:lnRef>
+          <a:fillRef idx="1">
+            <a:schemeClr val="accent1"/>
+          </a:fillRef>
+          <a:effectRef idx="0">
+            <a:schemeClr val="accent1"/>
+          </a:effectRef>
+          <a:fontRef idx="minor">
+            <a:schemeClr val="lt1"/>
+          </a:fontRef>
+        </p:style>
+        <p:txBody>
+          <a:bodyPr rtlCol="0" anchor="ctr"/>
+          <a:lstStyle/>
+          <a:p>
+            <a:pPr algn="ctr"/>
+            <a:r>
+              <a:rPr lang="de-DE" dirty="0" smtClean="0"/>
+              <a:t>Zusammenfassung 1 </a:t>
+            </a:r>
+            <a:endParaRPr lang="de-DE" dirty="0"/>
+          </a:p>
+        </p:txBody>
+      </p:sp>
+      <p:sp>
+        <p:nvSpPr>
+          <p:cNvPr id="8" name="Rechteck 7"/>
+          <p:cNvSpPr/>
+          <p:nvPr/>
+        </p:nvSpPr>
+        <p:spPr>
+          <a:xfrm>
+            <a:off x="578734" y="3611302"/>
+            <a:ext cx="7986532" cy="2700598"/>
+          </a:xfrm>
+          <a:prstGeom prst="rect">
+            <a:avLst/>
+          </a:prstGeom>
+        </p:spPr>
+        <p:style>
+          <a:lnRef idx="2">
+            <a:schemeClr val="accent1">
+              <a:shade val="50000"/>
+            </a:schemeClr>
+          </a:lnRef>
+          <a:fillRef idx="1">
+            <a:schemeClr val="accent1"/>
+          </a:fillRef>
+          <a:effectRef idx="0">
+            <a:schemeClr val="accent1"/>
+          </a:effectRef>
+          <a:fontRef idx="minor">
+            <a:schemeClr val="lt1"/>
+          </a:fontRef>
+        </p:style>
+        <p:txBody>
+          <a:bodyPr rtlCol="0" anchor="ctr"/>
+          <a:lstStyle/>
+          <a:p>
+            <a:pPr algn="ctr"/>
+            <a:r>
+              <a:rPr lang="de-DE" dirty="0" err="1" smtClean="0"/>
+              <a:t>Langtext</a:t>
+            </a:r>
+            <a:endParaRPr lang="de-DE" dirty="0"/>
+          </a:p>
+        </p:txBody>
+      </p:sp>
+    </p:spTree>
+    <p:extLst>
+      <p:ext uri="{BB962C8B-B14F-4D97-AF65-F5344CB8AC3E}">
+        <p14:creationId xmlns:p14="http://schemas.microsoft.com/office/powerpoint/2010/main" val="2163543590"/>
+      </p:ext>
+    </p:extLst>
+  </p:cSld>
+  <p:clrMapOvr>
+    <a:masterClrMapping/>
+  </p:clrMapOvr>
+  <p:timing>
+    <p:tnLst>
+      <p:par>
+        <p:cTn id="1" dur="indefinite" restart="never" nodeType="tmRoot"/>
+      </p:par>
+    </p:tnLst>
+  </p:timing>
 </p:sld>
 </file>
 

</xml_diff>